<commit_message>
pres1 kense snippet ups
</commit_message>
<xml_diff>
--- a/presentation1_CSAmodeling.pptx
+++ b/presentation1_CSAmodeling.pptx
@@ -211,7 +211,7 @@
           <a:p>
             <a:fld id="{C66B9852-DD5D-47D4-B529-0872AD29A2EA}" type="datetimeFigureOut">
               <a:rPr lang="en-US" smtClean="0"/>
-              <a:t>3/9/2020</a:t>
+              <a:t>09-Mar-20</a:t>
             </a:fld>
             <a:endParaRPr lang="en-US"/>
           </a:p>
@@ -780,7 +780,10 @@
           <a:bodyPr/>
           <a:lstStyle/>
           <a:p>
-            <a:endParaRPr lang="en-US" dirty="0"/>
+            <a:r>
+              <a:rPr lang="en-US" dirty="0"/>
+              <a:t>Notice time and duration (col E and F) as well as notice the categories and actions (col I and H respectively)</a:t>
+            </a:r>
           </a:p>
         </p:txBody>
       </p:sp>
@@ -864,32 +867,7 @@
           <a:bodyPr/>
           <a:lstStyle/>
           <a:p>
-            <a:r>
-              <a:rPr lang="en-US" dirty="0"/>
-              <a:t>Discovery: To generate a model to reflect events seen (what we will be doing with the speech act data we are given (</a:t>
-            </a:r>
-            <a:r>
-              <a:rPr lang="en-US" dirty="0" err="1"/>
-              <a:t>i.e</a:t>
-            </a:r>
-            <a:r>
-              <a:rPr lang="en-US" dirty="0"/>
-              <a:t>: blue in flowchart)</a:t>
-            </a:r>
-          </a:p>
-          <a:p>
-            <a:r>
-              <a:rPr lang="en-US" dirty="0"/>
-              <a:t>Conformance: Checking whether a model and seen events reflect one another (</a:t>
-            </a:r>
-            <a:r>
-              <a:rPr lang="en-US" dirty="0" err="1"/>
-              <a:t>i.e</a:t>
-            </a:r>
-            <a:r>
-              <a:rPr lang="en-US" dirty="0"/>
-              <a:t>: can be used to anticipate problems, or predict collaboration paths)</a:t>
-            </a:r>
+            <a:endParaRPr lang="en-US" dirty="0"/>
           </a:p>
         </p:txBody>
       </p:sp>
@@ -910,7 +888,7 @@
           <a:p>
             <a:fld id="{70CAC5E2-7E6F-4950-8CF5-371E8255B795}" type="slidenum">
               <a:rPr lang="en-US" smtClean="0"/>
-              <a:t>11</a:t>
+              <a:t>10</a:t>
             </a:fld>
             <a:endParaRPr lang="en-US"/>
           </a:p>
@@ -919,7 +897,7 @@
     </p:spTree>
     <p:extLst>
       <p:ext uri="{BB962C8B-B14F-4D97-AF65-F5344CB8AC3E}">
-        <p14:creationId xmlns:p14="http://schemas.microsoft.com/office/powerpoint/2010/main" val="1390077382"/>
+        <p14:creationId xmlns:p14="http://schemas.microsoft.com/office/powerpoint/2010/main" val="3045476114"/>
       </p:ext>
     </p:extLst>
   </p:cSld>
@@ -973,6 +951,205 @@
           <a:bodyPr/>
           <a:lstStyle/>
           <a:p>
+            <a:r>
+              <a:rPr lang="en-US" dirty="0"/>
+              <a:t>Discovery: To generate a model to reflect events seen (what we will be doing with the speech act data we are given (</a:t>
+            </a:r>
+            <a:r>
+              <a:rPr lang="en-US" dirty="0" err="1"/>
+              <a:t>i.e</a:t>
+            </a:r>
+            <a:r>
+              <a:rPr lang="en-US" dirty="0"/>
+              <a:t>: blue in flowchart)</a:t>
+            </a:r>
+          </a:p>
+          <a:p>
+            <a:r>
+              <a:rPr lang="en-US" dirty="0"/>
+              <a:t>Conformance: Checking whether a model and seen events reflect one another (</a:t>
+            </a:r>
+            <a:r>
+              <a:rPr lang="en-US" dirty="0" err="1"/>
+              <a:t>i.e</a:t>
+            </a:r>
+            <a:r>
+              <a:rPr lang="en-US" dirty="0"/>
+              <a:t>: can be used to anticipate problems, or predict collaboration paths)</a:t>
+            </a:r>
+          </a:p>
+        </p:txBody>
+      </p:sp>
+      <p:sp>
+        <p:nvSpPr>
+          <p:cNvPr id="4" name="Slide Number Placeholder 3"/>
+          <p:cNvSpPr>
+            <a:spLocks noGrp="1"/>
+          </p:cNvSpPr>
+          <p:nvPr>
+            <p:ph type="sldNum" sz="quarter" idx="5"/>
+          </p:nvPr>
+        </p:nvSpPr>
+        <p:spPr/>
+        <p:txBody>
+          <a:bodyPr/>
+          <a:lstStyle/>
+          <a:p>
+            <a:fld id="{70CAC5E2-7E6F-4950-8CF5-371E8255B795}" type="slidenum">
+              <a:rPr lang="en-US" smtClean="0"/>
+              <a:t>11</a:t>
+            </a:fld>
+            <a:endParaRPr lang="en-US"/>
+          </a:p>
+        </p:txBody>
+      </p:sp>
+    </p:spTree>
+    <p:extLst>
+      <p:ext uri="{BB962C8B-B14F-4D97-AF65-F5344CB8AC3E}">
+        <p14:creationId xmlns:p14="http://schemas.microsoft.com/office/powerpoint/2010/main" val="1390077382"/>
+      </p:ext>
+    </p:extLst>
+  </p:cSld>
+  <p:clrMapOvr>
+    <a:masterClrMapping/>
+  </p:clrMapOvr>
+</p:notes>
+</file>
+
+<file path=ppt/notesSlides/notesSlide7.xml><?xml version="1.0" encoding="utf-8"?>
+<p:notes xmlns:a="http://schemas.openxmlformats.org/drawingml/2006/main" xmlns:r="http://schemas.openxmlformats.org/officeDocument/2006/relationships" xmlns:p="http://schemas.openxmlformats.org/presentationml/2006/main">
+  <p:cSld>
+    <p:spTree>
+      <p:nvGrpSpPr>
+        <p:cNvPr id="1" name=""/>
+        <p:cNvGrpSpPr/>
+        <p:nvPr/>
+      </p:nvGrpSpPr>
+      <p:grpSpPr>
+        <a:xfrm>
+          <a:off x="0" y="0"/>
+          <a:ext cx="0" cy="0"/>
+          <a:chOff x="0" y="0"/>
+          <a:chExt cx="0" cy="0"/>
+        </a:xfrm>
+      </p:grpSpPr>
+      <p:sp>
+        <p:nvSpPr>
+          <p:cNvPr id="2" name="Slide Image Placeholder 1"/>
+          <p:cNvSpPr>
+            <a:spLocks noGrp="1" noRot="1" noChangeAspect="1"/>
+          </p:cNvSpPr>
+          <p:nvPr>
+            <p:ph type="sldImg"/>
+          </p:nvPr>
+        </p:nvSpPr>
+        <p:spPr/>
+      </p:sp>
+      <p:sp>
+        <p:nvSpPr>
+          <p:cNvPr id="3" name="Notes Placeholder 2"/>
+          <p:cNvSpPr>
+            <a:spLocks noGrp="1"/>
+          </p:cNvSpPr>
+          <p:nvPr>
+            <p:ph type="body" idx="1"/>
+          </p:nvPr>
+        </p:nvSpPr>
+        <p:spPr/>
+        <p:txBody>
+          <a:bodyPr/>
+          <a:lstStyle/>
+          <a:p>
+            <a:r>
+              <a:rPr lang="en-US" dirty="0"/>
+              <a:t>Nodes represent activities and arcs represents causal dependencies</a:t>
+            </a:r>
+          </a:p>
+          <a:p>
+            <a:endParaRPr lang="en-US" dirty="0"/>
+          </a:p>
+        </p:txBody>
+      </p:sp>
+      <p:sp>
+        <p:nvSpPr>
+          <p:cNvPr id="4" name="Slide Number Placeholder 3"/>
+          <p:cNvSpPr>
+            <a:spLocks noGrp="1"/>
+          </p:cNvSpPr>
+          <p:nvPr>
+            <p:ph type="sldNum" sz="quarter" idx="5"/>
+          </p:nvPr>
+        </p:nvSpPr>
+        <p:spPr/>
+        <p:txBody>
+          <a:bodyPr/>
+          <a:lstStyle/>
+          <a:p>
+            <a:fld id="{70CAC5E2-7E6F-4950-8CF5-371E8255B795}" type="slidenum">
+              <a:rPr lang="en-US" smtClean="0"/>
+              <a:t>12</a:t>
+            </a:fld>
+            <a:endParaRPr lang="en-US"/>
+          </a:p>
+        </p:txBody>
+      </p:sp>
+    </p:spTree>
+    <p:extLst>
+      <p:ext uri="{BB962C8B-B14F-4D97-AF65-F5344CB8AC3E}">
+        <p14:creationId xmlns:p14="http://schemas.microsoft.com/office/powerpoint/2010/main" val="629109400"/>
+      </p:ext>
+    </p:extLst>
+  </p:cSld>
+  <p:clrMapOvr>
+    <a:masterClrMapping/>
+  </p:clrMapOvr>
+</p:notes>
+</file>
+
+<file path=ppt/notesSlides/notesSlide8.xml><?xml version="1.0" encoding="utf-8"?>
+<p:notes xmlns:a="http://schemas.openxmlformats.org/drawingml/2006/main" xmlns:r="http://schemas.openxmlformats.org/officeDocument/2006/relationships" xmlns:p="http://schemas.openxmlformats.org/presentationml/2006/main">
+  <p:cSld>
+    <p:spTree>
+      <p:nvGrpSpPr>
+        <p:cNvPr id="1" name=""/>
+        <p:cNvGrpSpPr/>
+        <p:nvPr/>
+      </p:nvGrpSpPr>
+      <p:grpSpPr>
+        <a:xfrm>
+          <a:off x="0" y="0"/>
+          <a:ext cx="0" cy="0"/>
+          <a:chOff x="0" y="0"/>
+          <a:chExt cx="0" cy="0"/>
+        </a:xfrm>
+      </p:grpSpPr>
+      <p:sp>
+        <p:nvSpPr>
+          <p:cNvPr id="2" name="Slide Image Placeholder 1"/>
+          <p:cNvSpPr>
+            <a:spLocks noGrp="1" noRot="1" noChangeAspect="1"/>
+          </p:cNvSpPr>
+          <p:nvPr>
+            <p:ph type="sldImg"/>
+          </p:nvPr>
+        </p:nvSpPr>
+        <p:spPr/>
+      </p:sp>
+      <p:sp>
+        <p:nvSpPr>
+          <p:cNvPr id="3" name="Notes Placeholder 2"/>
+          <p:cNvSpPr>
+            <a:spLocks noGrp="1"/>
+          </p:cNvSpPr>
+          <p:nvPr>
+            <p:ph type="body" idx="1"/>
+          </p:nvPr>
+        </p:nvSpPr>
+        <p:spPr/>
+        <p:txBody>
+          <a:bodyPr/>
+          <a:lstStyle/>
+          <a:p>
             <a:endParaRPr lang="en-US" dirty="0"/>
           </a:p>
         </p:txBody>
@@ -1013,7 +1190,7 @@
 </p:notes>
 </file>
 
-<file path=ppt/notesSlides/notesSlide7.xml><?xml version="1.0" encoding="utf-8"?>
+<file path=ppt/notesSlides/notesSlide9.xml><?xml version="1.0" encoding="utf-8"?>
 <p:notes xmlns:a="http://schemas.openxmlformats.org/drawingml/2006/main" xmlns:r="http://schemas.openxmlformats.org/officeDocument/2006/relationships" xmlns:p="http://schemas.openxmlformats.org/presentationml/2006/main">
   <p:cSld>
     <p:spTree>
@@ -1253,7 +1430,7 @@
           <a:p>
             <a:fld id="{80A40925-20D3-4779-B19B-C89593154448}" type="datetimeFigureOut">
               <a:rPr lang="en-US" smtClean="0"/>
-              <a:t>3/9/2020</a:t>
+              <a:t>09-Mar-20</a:t>
             </a:fld>
             <a:endParaRPr lang="en-US"/>
           </a:p>
@@ -1451,7 +1628,7 @@
           <a:p>
             <a:fld id="{80A40925-20D3-4779-B19B-C89593154448}" type="datetimeFigureOut">
               <a:rPr lang="en-US" smtClean="0"/>
-              <a:t>3/9/2020</a:t>
+              <a:t>09-Mar-20</a:t>
             </a:fld>
             <a:endParaRPr lang="en-US"/>
           </a:p>
@@ -1659,7 +1836,7 @@
           <a:p>
             <a:fld id="{80A40925-20D3-4779-B19B-C89593154448}" type="datetimeFigureOut">
               <a:rPr lang="en-US" smtClean="0"/>
-              <a:t>3/9/2020</a:t>
+              <a:t>09-Mar-20</a:t>
             </a:fld>
             <a:endParaRPr lang="en-US"/>
           </a:p>
@@ -1857,7 +2034,7 @@
           <a:p>
             <a:fld id="{80A40925-20D3-4779-B19B-C89593154448}" type="datetimeFigureOut">
               <a:rPr lang="en-US" smtClean="0"/>
-              <a:t>3/9/2020</a:t>
+              <a:t>09-Mar-20</a:t>
             </a:fld>
             <a:endParaRPr lang="en-US"/>
           </a:p>
@@ -2132,7 +2309,7 @@
           <a:p>
             <a:fld id="{80A40925-20D3-4779-B19B-C89593154448}" type="datetimeFigureOut">
               <a:rPr lang="en-US" smtClean="0"/>
-              <a:t>3/9/2020</a:t>
+              <a:t>09-Mar-20</a:t>
             </a:fld>
             <a:endParaRPr lang="en-US"/>
           </a:p>
@@ -2397,7 +2574,7 @@
           <a:p>
             <a:fld id="{80A40925-20D3-4779-B19B-C89593154448}" type="datetimeFigureOut">
               <a:rPr lang="en-US" smtClean="0"/>
-              <a:t>3/9/2020</a:t>
+              <a:t>09-Mar-20</a:t>
             </a:fld>
             <a:endParaRPr lang="en-US"/>
           </a:p>
@@ -2809,7 +2986,7 @@
           <a:p>
             <a:fld id="{80A40925-20D3-4779-B19B-C89593154448}" type="datetimeFigureOut">
               <a:rPr lang="en-US" smtClean="0"/>
-              <a:t>3/9/2020</a:t>
+              <a:t>09-Mar-20</a:t>
             </a:fld>
             <a:endParaRPr lang="en-US"/>
           </a:p>
@@ -2950,7 +3127,7 @@
           <a:p>
             <a:fld id="{80A40925-20D3-4779-B19B-C89593154448}" type="datetimeFigureOut">
               <a:rPr lang="en-US" smtClean="0"/>
-              <a:t>3/9/2020</a:t>
+              <a:t>09-Mar-20</a:t>
             </a:fld>
             <a:endParaRPr lang="en-US"/>
           </a:p>
@@ -3063,7 +3240,7 @@
           <a:p>
             <a:fld id="{80A40925-20D3-4779-B19B-C89593154448}" type="datetimeFigureOut">
               <a:rPr lang="en-US" smtClean="0"/>
-              <a:t>3/9/2020</a:t>
+              <a:t>09-Mar-20</a:t>
             </a:fld>
             <a:endParaRPr lang="en-US"/>
           </a:p>
@@ -3374,7 +3551,7 @@
           <a:p>
             <a:fld id="{80A40925-20D3-4779-B19B-C89593154448}" type="datetimeFigureOut">
               <a:rPr lang="en-US" smtClean="0"/>
-              <a:t>3/9/2020</a:t>
+              <a:t>09-Mar-20</a:t>
             </a:fld>
             <a:endParaRPr lang="en-US"/>
           </a:p>
@@ -3662,7 +3839,7 @@
           <a:p>
             <a:fld id="{80A40925-20D3-4779-B19B-C89593154448}" type="datetimeFigureOut">
               <a:rPr lang="en-US" smtClean="0"/>
-              <a:t>3/9/2020</a:t>
+              <a:t>09-Mar-20</a:t>
             </a:fld>
             <a:endParaRPr lang="en-US"/>
           </a:p>
@@ -3903,7 +4080,7 @@
           <a:p>
             <a:fld id="{80A40925-20D3-4779-B19B-C89593154448}" type="datetimeFigureOut">
               <a:rPr lang="en-US" smtClean="0"/>
-              <a:t>3/9/2020</a:t>
+              <a:t>09-Mar-20</a:t>
             </a:fld>
             <a:endParaRPr lang="en-US"/>
           </a:p>
@@ -4959,7 +5136,7 @@
             </p:nvSpPr>
             <p:spPr>
               <a:blipFill>
-                <a:blip r:embed="rId2"/>
+                <a:blip r:embed="rId3"/>
                 <a:stretch>
                   <a:fillRect l="-1043" t="-2241"/>
                 </a:stretch>
@@ -5031,38 +5208,45 @@
           <a:bodyPr/>
           <a:lstStyle/>
           <a:p>
-            <a:endParaRPr lang="en-US"/>
-          </a:p>
-        </p:txBody>
-      </p:sp>
-      <p:sp>
-        <p:nvSpPr>
-          <p:cNvPr id="3" name="Content Placeholder 2">
-            <a:extLst>
-              <a:ext uri="{FF2B5EF4-FFF2-40B4-BE49-F238E27FC236}">
-                <a16:creationId xmlns:a16="http://schemas.microsoft.com/office/drawing/2014/main" id="{6CA39058-900E-4DCE-B0FC-B31B4E38F43B}"/>
-              </a:ext>
-            </a:extLst>
-          </p:cNvPr>
-          <p:cNvSpPr>
-            <a:spLocks noGrp="1"/>
-          </p:cNvSpPr>
+            <a:endParaRPr lang="en-US" dirty="0"/>
+          </a:p>
+        </p:txBody>
+      </p:sp>
+      <p:pic>
+        <p:nvPicPr>
+          <p:cNvPr id="5" name="Content Placeholder 4">
+            <a:extLst>
+              <a:ext uri="{FF2B5EF4-FFF2-40B4-BE49-F238E27FC236}">
+                <a16:creationId xmlns:a16="http://schemas.microsoft.com/office/drawing/2014/main" id="{7BD21ED6-0E45-4698-AFCD-7C7C344ECC0F}"/>
+              </a:ext>
+            </a:extLst>
+          </p:cNvPr>
+          <p:cNvPicPr>
+            <a:picLocks noGrp="1" noChangeAspect="1"/>
+          </p:cNvPicPr>
           <p:nvPr>
             <p:ph idx="1"/>
           </p:nvPr>
-        </p:nvSpPr>
-        <p:spPr/>
-        <p:txBody>
-          <a:bodyPr/>
-          <a:lstStyle/>
-          <a:p>
-            <a:r>
-              <a:rPr lang="en-US" dirty="0"/>
-              <a:t>//I will add a snippet of a causal net here</a:t>
-            </a:r>
-          </a:p>
-        </p:txBody>
-      </p:sp>
+        </p:nvPicPr>
+        <p:blipFill>
+          <a:blip r:embed="rId2">
+            <a:extLst>
+              <a:ext uri="{28A0092B-C50C-407E-A947-70E740481C1C}">
+                <a14:useLocalDpi xmlns:a14="http://schemas.microsoft.com/office/drawing/2010/main" val="0"/>
+              </a:ext>
+            </a:extLst>
+          </a:blip>
+          <a:stretch>
+            <a:fillRect/>
+          </a:stretch>
+        </p:blipFill>
+        <p:spPr>
+          <a:xfrm>
+            <a:off x="1501140" y="0"/>
+            <a:ext cx="9189720" cy="6859376"/>
+          </a:xfrm>
+        </p:spPr>
+      </p:pic>
     </p:spTree>
     <p:extLst>
       <p:ext uri="{BB962C8B-B14F-4D97-AF65-F5344CB8AC3E}">

</xml_diff>